<commit_message>
Add updated PowerPoint presentation file
Add updated PowerPoint presentation file
</commit_message>
<xml_diff>
--- a/Data Analysis Project for Nulnet March 2024.pptx
+++ b/Data Analysis Project for Nulnet March 2024.pptx
@@ -261,7 +261,7 @@
           <a:p>
             <a:fld id="{D40757AC-DC10-4B94-AC96-3B64501BAD13}" type="datetimeFigureOut">
               <a:rPr lang="en-US" smtClean="0"/>
-              <a:t>3/19/2024</a:t>
+              <a:t>3/21/2024</a:t>
             </a:fld>
             <a:endParaRPr lang="en-US"/>
           </a:p>
@@ -459,7 +459,7 @@
           <a:p>
             <a:fld id="{D40757AC-DC10-4B94-AC96-3B64501BAD13}" type="datetimeFigureOut">
               <a:rPr lang="en-US" smtClean="0"/>
-              <a:t>3/19/2024</a:t>
+              <a:t>3/21/2024</a:t>
             </a:fld>
             <a:endParaRPr lang="en-US"/>
           </a:p>
@@ -667,7 +667,7 @@
           <a:p>
             <a:fld id="{D40757AC-DC10-4B94-AC96-3B64501BAD13}" type="datetimeFigureOut">
               <a:rPr lang="en-US" smtClean="0"/>
-              <a:t>3/19/2024</a:t>
+              <a:t>3/21/2024</a:t>
             </a:fld>
             <a:endParaRPr lang="en-US"/>
           </a:p>
@@ -865,7 +865,7 @@
           <a:p>
             <a:fld id="{D40757AC-DC10-4B94-AC96-3B64501BAD13}" type="datetimeFigureOut">
               <a:rPr lang="en-US" smtClean="0"/>
-              <a:t>3/19/2024</a:t>
+              <a:t>3/21/2024</a:t>
             </a:fld>
             <a:endParaRPr lang="en-US"/>
           </a:p>
@@ -1140,7 +1140,7 @@
           <a:p>
             <a:fld id="{D40757AC-DC10-4B94-AC96-3B64501BAD13}" type="datetimeFigureOut">
               <a:rPr lang="en-US" smtClean="0"/>
-              <a:t>3/19/2024</a:t>
+              <a:t>3/21/2024</a:t>
             </a:fld>
             <a:endParaRPr lang="en-US"/>
           </a:p>
@@ -1405,7 +1405,7 @@
           <a:p>
             <a:fld id="{D40757AC-DC10-4B94-AC96-3B64501BAD13}" type="datetimeFigureOut">
               <a:rPr lang="en-US" smtClean="0"/>
-              <a:t>3/19/2024</a:t>
+              <a:t>3/21/2024</a:t>
             </a:fld>
             <a:endParaRPr lang="en-US"/>
           </a:p>
@@ -1817,7 +1817,7 @@
           <a:p>
             <a:fld id="{D40757AC-DC10-4B94-AC96-3B64501BAD13}" type="datetimeFigureOut">
               <a:rPr lang="en-US" smtClean="0"/>
-              <a:t>3/19/2024</a:t>
+              <a:t>3/21/2024</a:t>
             </a:fld>
             <a:endParaRPr lang="en-US"/>
           </a:p>
@@ -1958,7 +1958,7 @@
           <a:p>
             <a:fld id="{D40757AC-DC10-4B94-AC96-3B64501BAD13}" type="datetimeFigureOut">
               <a:rPr lang="en-US" smtClean="0"/>
-              <a:t>3/19/2024</a:t>
+              <a:t>3/21/2024</a:t>
             </a:fld>
             <a:endParaRPr lang="en-US"/>
           </a:p>
@@ -2071,7 +2071,7 @@
           <a:p>
             <a:fld id="{D40757AC-DC10-4B94-AC96-3B64501BAD13}" type="datetimeFigureOut">
               <a:rPr lang="en-US" smtClean="0"/>
-              <a:t>3/19/2024</a:t>
+              <a:t>3/21/2024</a:t>
             </a:fld>
             <a:endParaRPr lang="en-US"/>
           </a:p>
@@ -2382,7 +2382,7 @@
           <a:p>
             <a:fld id="{D40757AC-DC10-4B94-AC96-3B64501BAD13}" type="datetimeFigureOut">
               <a:rPr lang="en-US" smtClean="0"/>
-              <a:t>3/19/2024</a:t>
+              <a:t>3/21/2024</a:t>
             </a:fld>
             <a:endParaRPr lang="en-US"/>
           </a:p>
@@ -2670,7 +2670,7 @@
           <a:p>
             <a:fld id="{D40757AC-DC10-4B94-AC96-3B64501BAD13}" type="datetimeFigureOut">
               <a:rPr lang="en-US" smtClean="0"/>
-              <a:t>3/19/2024</a:t>
+              <a:t>3/21/2024</a:t>
             </a:fld>
             <a:endParaRPr lang="en-US"/>
           </a:p>
@@ -2762,6 +2762,7 @@
               <a:schemeClr val="accent1">
                 <a:lumMod val="45000"/>
                 <a:lumOff val="55000"/>
+                <a:alpha val="26000"/>
               </a:schemeClr>
             </a:gs>
             <a:gs pos="91000">
@@ -2943,7 +2944,7 @@
           <a:p>
             <a:fld id="{D40757AC-DC10-4B94-AC96-3B64501BAD13}" type="datetimeFigureOut">
               <a:rPr lang="en-US" smtClean="0"/>
-              <a:t>3/19/2024</a:t>
+              <a:t>3/21/2024</a:t>
             </a:fld>
             <a:endParaRPr lang="en-US"/>
           </a:p>
@@ -3385,13 +3386,8 @@
           <a:p>
             <a:r>
               <a:rPr lang="en-US" dirty="0"/>
-              <a:t>Data Analysis Project for </a:t>
-            </a:r>
-            <a:r>
-              <a:rPr lang="en-US" dirty="0" err="1"/>
-              <a:t>Nulnet</a:t>
-            </a:r>
-            <a:endParaRPr lang="en-US" dirty="0"/>
+              <a:t>Data Analysis Project for Nelnet</a:t>
+            </a:r>
           </a:p>
         </p:txBody>
       </p:sp>
@@ -3518,7 +3514,7 @@
             <a:pPr lvl="1"/>
             <a:r>
               <a:rPr lang="en-US" dirty="0"/>
-              <a:t>Main datetime column of interest is </a:t>
+              <a:t>Main datetime column is </a:t>
             </a:r>
             <a:r>
               <a:rPr lang="en-US" dirty="0" err="1"/>
@@ -3526,14 +3522,14 @@
             </a:r>
             <a:r>
               <a:rPr lang="en-US" dirty="0"/>
-              <a:t>: i.e., the issue (origination) date of the loan</a:t>
+              <a:t>: the issue (origination) date of the loan</a:t>
             </a:r>
           </a:p>
           <a:p>
             <a:pPr lvl="1"/>
             <a:r>
               <a:rPr lang="en-US" dirty="0"/>
-              <a:t>NB: the datetime only shows Month &amp; year, so we cannot drill down to weekly or daily flows of data.</a:t>
+              <a:t>Only shows Month &amp; Year, so we cannot drill down to weekly or daily flows of data.</a:t>
             </a:r>
           </a:p>
           <a:p>
@@ -3561,7 +3557,7 @@
             </a:r>
             <a:r>
               <a:rPr lang="en-US" dirty="0"/>
-              <a:t> column, which specifies the current status of the loan as of the dates shown in the data</a:t>
+              <a:t> column, which specifies the current status of the loan</a:t>
             </a:r>
           </a:p>
           <a:p>
@@ -3626,7 +3622,13 @@
           <a:p>
             <a:r>
               <a:rPr lang="en-US" dirty="0"/>
-              <a:t>Loan performance: I will simplify </a:t>
+              <a:t>Loan performance:</a:t>
+            </a:r>
+          </a:p>
+          <a:p>
+            <a:r>
+              <a:rPr lang="en-US" dirty="0"/>
+              <a:t>Simplifying </a:t>
             </a:r>
             <a:r>
               <a:rPr lang="en-US" dirty="0" err="1"/>
@@ -3634,7 +3636,7 @@
             </a:r>
             <a:r>
               <a:rPr lang="en-US" dirty="0"/>
-              <a:t> by transforming and collapsing the various categories of the column into a new </a:t>
+              <a:t> by transforming the various categories of the column into a new </a:t>
             </a:r>
             <a:r>
               <a:rPr lang="en-US" dirty="0" err="1"/>
@@ -3656,7 +3658,7 @@
             <a:pPr lvl="1"/>
             <a:r>
               <a:rPr lang="en-US" dirty="0"/>
-              <a:t>“Bad” (performance): In Grace Period, Charged off, and both ‘Late (… days)’ categories</a:t>
+              <a:t>“Bad” (performance): In Grace Period, Charged off, and both ‘Late…’ categories</a:t>
             </a:r>
           </a:p>
           <a:p>

</xml_diff>

<commit_message>
Add updated powerpoint file
Add updated powerpoint file
</commit_message>
<xml_diff>
--- a/Data Analysis Project for Nulnet March 2024.pptx
+++ b/Data Analysis Project for Nulnet March 2024.pptx
@@ -3779,7 +3779,7 @@
         <p:spPr/>
         <p:txBody>
           <a:bodyPr>
-            <a:normAutofit fontScale="62500" lnSpcReduction="20000"/>
+            <a:normAutofit fontScale="55000" lnSpcReduction="20000"/>
           </a:bodyPr>
           <a:lstStyle/>
           <a:p>
@@ -3948,6 +3948,23 @@
             <a:r>
               <a:rPr lang="en-US" dirty="0"/>
               <a:t> to store/backup several files and track changes.</a:t>
+            </a:r>
+          </a:p>
+          <a:p>
+            <a:pPr lvl="1"/>
+            <a:r>
+              <a:rPr lang="en-US" dirty="0"/>
+              <a:t>Link to GitHub repo: &lt;</a:t>
+            </a:r>
+            <a:r>
+              <a:rPr lang="en-US" dirty="0">
+                <a:hlinkClick r:id="rId2"/>
+              </a:rPr>
+              <a:t>https://github.com/Kallen113/lending-data-analysis/tree/main</a:t>
+            </a:r>
+            <a:r>
+              <a:rPr lang="en-US" dirty="0"/>
+              <a:t>&gt; </a:t>
             </a:r>
           </a:p>
           <a:p>

</xml_diff>